<commit_message>
add study_id page, update logo.
</commit_message>
<xml_diff>
--- a/static/assets/img/gtreklogo.pptx
+++ b/static/assets/img/gtreklogo.pptx
@@ -7,6 +7,7 @@
   <p:sldIdLst>
     <p:sldId id="258" r:id="rId2"/>
     <p:sldId id="260" r:id="rId3"/>
+    <p:sldId id="261" r:id="rId4"/>
   </p:sldIdLst>
   <p:sldSz cx="3600450" cy="1079500"/>
   <p:notesSz cx="6858000" cy="9144000"/>
@@ -255,7 +256,7 @@
           <a:p>
             <a:fld id="{F810E1C8-151A-41B5-9C68-520A04EE1AF2}" type="datetimeFigureOut">
               <a:rPr lang="en-GB" smtClean="0"/>
-              <a:t>14/01/2021</a:t>
+              <a:t>07/01/2026</a:t>
             </a:fld>
             <a:endParaRPr lang="en-GB"/>
           </a:p>
@@ -425,7 +426,7 @@
           <a:p>
             <a:fld id="{F810E1C8-151A-41B5-9C68-520A04EE1AF2}" type="datetimeFigureOut">
               <a:rPr lang="en-GB" smtClean="0"/>
-              <a:t>14/01/2021</a:t>
+              <a:t>07/01/2026</a:t>
             </a:fld>
             <a:endParaRPr lang="en-GB"/>
           </a:p>
@@ -605,7 +606,7 @@
           <a:p>
             <a:fld id="{F810E1C8-151A-41B5-9C68-520A04EE1AF2}" type="datetimeFigureOut">
               <a:rPr lang="en-GB" smtClean="0"/>
-              <a:t>14/01/2021</a:t>
+              <a:t>07/01/2026</a:t>
             </a:fld>
             <a:endParaRPr lang="en-GB"/>
           </a:p>
@@ -775,7 +776,7 @@
           <a:p>
             <a:fld id="{F810E1C8-151A-41B5-9C68-520A04EE1AF2}" type="datetimeFigureOut">
               <a:rPr lang="en-GB" smtClean="0"/>
-              <a:t>14/01/2021</a:t>
+              <a:t>07/01/2026</a:t>
             </a:fld>
             <a:endParaRPr lang="en-GB"/>
           </a:p>
@@ -1021,7 +1022,7 @@
           <a:p>
             <a:fld id="{F810E1C8-151A-41B5-9C68-520A04EE1AF2}" type="datetimeFigureOut">
               <a:rPr lang="en-GB" smtClean="0"/>
-              <a:t>14/01/2021</a:t>
+              <a:t>07/01/2026</a:t>
             </a:fld>
             <a:endParaRPr lang="en-GB"/>
           </a:p>
@@ -1253,7 +1254,7 @@
           <a:p>
             <a:fld id="{F810E1C8-151A-41B5-9C68-520A04EE1AF2}" type="datetimeFigureOut">
               <a:rPr lang="en-GB" smtClean="0"/>
-              <a:t>14/01/2021</a:t>
+              <a:t>07/01/2026</a:t>
             </a:fld>
             <a:endParaRPr lang="en-GB"/>
           </a:p>
@@ -1620,7 +1621,7 @@
           <a:p>
             <a:fld id="{F810E1C8-151A-41B5-9C68-520A04EE1AF2}" type="datetimeFigureOut">
               <a:rPr lang="en-GB" smtClean="0"/>
-              <a:t>14/01/2021</a:t>
+              <a:t>07/01/2026</a:t>
             </a:fld>
             <a:endParaRPr lang="en-GB"/>
           </a:p>
@@ -1738,7 +1739,7 @@
           <a:p>
             <a:fld id="{F810E1C8-151A-41B5-9C68-520A04EE1AF2}" type="datetimeFigureOut">
               <a:rPr lang="en-GB" smtClean="0"/>
-              <a:t>14/01/2021</a:t>
+              <a:t>07/01/2026</a:t>
             </a:fld>
             <a:endParaRPr lang="en-GB"/>
           </a:p>
@@ -1833,7 +1834,7 @@
           <a:p>
             <a:fld id="{F810E1C8-151A-41B5-9C68-520A04EE1AF2}" type="datetimeFigureOut">
               <a:rPr lang="en-GB" smtClean="0"/>
-              <a:t>14/01/2021</a:t>
+              <a:t>07/01/2026</a:t>
             </a:fld>
             <a:endParaRPr lang="en-GB"/>
           </a:p>
@@ -2110,7 +2111,7 @@
           <a:p>
             <a:fld id="{F810E1C8-151A-41B5-9C68-520A04EE1AF2}" type="datetimeFigureOut">
               <a:rPr lang="en-GB" smtClean="0"/>
-              <a:t>14/01/2021</a:t>
+              <a:t>07/01/2026</a:t>
             </a:fld>
             <a:endParaRPr lang="en-GB"/>
           </a:p>
@@ -2367,7 +2368,7 @@
           <a:p>
             <a:fld id="{F810E1C8-151A-41B5-9C68-520A04EE1AF2}" type="datetimeFigureOut">
               <a:rPr lang="en-GB" smtClean="0"/>
-              <a:t>14/01/2021</a:t>
+              <a:t>07/01/2026</a:t>
             </a:fld>
             <a:endParaRPr lang="en-GB"/>
           </a:p>
@@ -2580,7 +2581,7 @@
           <a:p>
             <a:fld id="{F810E1C8-151A-41B5-9C68-520A04EE1AF2}" type="datetimeFigureOut">
               <a:rPr lang="en-GB" smtClean="0"/>
-              <a:t>14/01/2021</a:t>
+              <a:t>07/01/2026</a:t>
             </a:fld>
             <a:endParaRPr lang="en-GB"/>
           </a:p>
@@ -3282,7 +3283,7 @@
         </p:nvSpPr>
         <p:spPr>
           <a:xfrm>
-            <a:off x="1137829" y="20547"/>
+            <a:off x="1137829" y="-82357"/>
             <a:ext cx="2050561" cy="1200329"/>
           </a:xfrm>
           <a:prstGeom prst="rect">
@@ -3324,7 +3325,7 @@
         </p:nvSpPr>
         <p:spPr>
           <a:xfrm>
-            <a:off x="889149" y="373092"/>
+            <a:off x="889149" y="270188"/>
             <a:ext cx="248680" cy="333314"/>
           </a:xfrm>
           <a:custGeom>
@@ -3437,7 +3438,7 @@
         </p:nvSpPr>
         <p:spPr>
           <a:xfrm>
-            <a:off x="3149710" y="503796"/>
+            <a:off x="3149710" y="400892"/>
             <a:ext cx="277716" cy="277716"/>
           </a:xfrm>
           <a:prstGeom prst="roundRect">
@@ -3489,7 +3490,7 @@
         </p:nvSpPr>
         <p:spPr>
           <a:xfrm>
-            <a:off x="90558" y="43745"/>
+            <a:off x="90558" y="-59159"/>
             <a:ext cx="808235" cy="1200329"/>
           </a:xfrm>
           <a:prstGeom prst="rect">
@@ -3521,6 +3522,308 @@
     <p:extLst>
       <p:ext uri="{BB962C8B-B14F-4D97-AF65-F5344CB8AC3E}">
         <p14:creationId xmlns:p14="http://schemas.microsoft.com/office/powerpoint/2010/main" val="568506256"/>
+      </p:ext>
+    </p:extLst>
+  </p:cSld>
+  <p:clrMapOvr>
+    <a:masterClrMapping/>
+  </p:clrMapOvr>
+</p:sld>
+</file>
+
+<file path=ppt/slides/slide3.xml><?xml version="1.0" encoding="utf-8"?>
+<p:sld xmlns:a="http://schemas.openxmlformats.org/drawingml/2006/main" xmlns:r="http://schemas.openxmlformats.org/officeDocument/2006/relationships" xmlns:p="http://schemas.openxmlformats.org/presentationml/2006/main">
+  <p:cSld>
+    <p:spTree>
+      <p:nvGrpSpPr>
+        <p:cNvPr id="1" name="">
+          <a:extLst>
+            <a:ext uri="{FF2B5EF4-FFF2-40B4-BE49-F238E27FC236}">
+              <a16:creationId xmlns:a16="http://schemas.microsoft.com/office/drawing/2014/main" id="{32992022-707F-A78A-70CD-14E8604B0EC7}"/>
+            </a:ext>
+          </a:extLst>
+        </p:cNvPr>
+        <p:cNvGrpSpPr/>
+        <p:nvPr/>
+      </p:nvGrpSpPr>
+      <p:grpSpPr>
+        <a:xfrm>
+          <a:off x="0" y="0"/>
+          <a:ext cx="0" cy="0"/>
+          <a:chOff x="0" y="0"/>
+          <a:chExt cx="0" cy="0"/>
+        </a:xfrm>
+      </p:grpSpPr>
+      <p:grpSp>
+        <p:nvGrpSpPr>
+          <p:cNvPr id="2" name="Group 1">
+            <a:extLst>
+              <a:ext uri="{FF2B5EF4-FFF2-40B4-BE49-F238E27FC236}">
+                <a16:creationId xmlns:a16="http://schemas.microsoft.com/office/drawing/2014/main" id="{CB8DBF28-18A2-BBB2-6321-45A95A2A9FE5}"/>
+              </a:ext>
+            </a:extLst>
+          </p:cNvPr>
+          <p:cNvGrpSpPr/>
+          <p:nvPr/>
+        </p:nvGrpSpPr>
+        <p:grpSpPr>
+          <a:xfrm>
+            <a:off x="194408" y="-64368"/>
+            <a:ext cx="3110034" cy="1208236"/>
+            <a:chOff x="213406" y="-68322"/>
+            <a:chExt cx="3110034" cy="1208236"/>
+          </a:xfrm>
+        </p:grpSpPr>
+        <p:sp>
+          <p:nvSpPr>
+            <p:cNvPr id="4" name="TextBox 3">
+              <a:extLst>
+                <a:ext uri="{FF2B5EF4-FFF2-40B4-BE49-F238E27FC236}">
+                  <a16:creationId xmlns:a16="http://schemas.microsoft.com/office/drawing/2014/main" id="{078571DA-11D2-A480-0AC1-FB5FA1030B67}"/>
+                </a:ext>
+              </a:extLst>
+            </p:cNvPr>
+            <p:cNvSpPr txBox="1"/>
+            <p:nvPr/>
+          </p:nvSpPr>
+          <p:spPr>
+            <a:xfrm>
+              <a:off x="1137829" y="-60415"/>
+              <a:ext cx="1907895" cy="1200329"/>
+            </a:xfrm>
+            <a:prstGeom prst="rect">
+              <a:avLst/>
+            </a:prstGeom>
+            <a:noFill/>
+            <a:effectLst/>
+          </p:spPr>
+          <p:txBody>
+            <a:bodyPr wrap="none" rtlCol="0">
+              <a:spAutoFit/>
+            </a:bodyPr>
+            <a:lstStyle/>
+            <a:p>
+              <a:r>
+                <a:rPr lang="en-GB" sz="7200" dirty="0">
+                  <a:latin typeface="Geist" pitchFamily="2" charset="77"/>
+                  <a:ea typeface="Geist" pitchFamily="2" charset="77"/>
+                  <a:cs typeface="Geist" pitchFamily="2" charset="77"/>
+                </a:rPr>
+                <a:t>trac</a:t>
+              </a:r>
+            </a:p>
+          </p:txBody>
+        </p:sp>
+        <p:sp>
+          <p:nvSpPr>
+            <p:cNvPr id="17" name="Google Shape;4956;p65">
+              <a:extLst>
+                <a:ext uri="{FF2B5EF4-FFF2-40B4-BE49-F238E27FC236}">
+                  <a16:creationId xmlns:a16="http://schemas.microsoft.com/office/drawing/2014/main" id="{59E6519B-855E-70D3-8F1C-D0D0C5F791E5}"/>
+                </a:ext>
+              </a:extLst>
+            </p:cNvPr>
+            <p:cNvSpPr/>
+            <p:nvPr/>
+          </p:nvSpPr>
+          <p:spPr>
+            <a:xfrm>
+              <a:off x="946299" y="365186"/>
+              <a:ext cx="248680" cy="333314"/>
+            </a:xfrm>
+            <a:custGeom>
+              <a:avLst/>
+              <a:gdLst/>
+              <a:ahLst/>
+              <a:cxnLst/>
+              <a:rect l="l" t="t" r="r" b="b"/>
+              <a:pathLst>
+                <a:path w="1148" h="1662" extrusionOk="0">
+                  <a:moveTo>
+                    <a:pt x="52" y="1"/>
+                  </a:moveTo>
+                  <a:cubicBezTo>
+                    <a:pt x="27" y="1"/>
+                    <a:pt x="0" y="24"/>
+                    <a:pt x="0" y="56"/>
+                  </a:cubicBezTo>
+                  <a:lnTo>
+                    <a:pt x="0" y="200"/>
+                  </a:lnTo>
+                  <a:cubicBezTo>
+                    <a:pt x="0" y="243"/>
+                    <a:pt x="22" y="279"/>
+                    <a:pt x="51" y="308"/>
+                  </a:cubicBezTo>
+                  <a:lnTo>
+                    <a:pt x="700" y="791"/>
+                  </a:lnTo>
+                  <a:cubicBezTo>
+                    <a:pt x="729" y="813"/>
+                    <a:pt x="729" y="849"/>
+                    <a:pt x="700" y="871"/>
+                  </a:cubicBezTo>
+                  <a:lnTo>
+                    <a:pt x="51" y="1354"/>
+                  </a:lnTo>
+                  <a:cubicBezTo>
+                    <a:pt x="22" y="1383"/>
+                    <a:pt x="0" y="1419"/>
+                    <a:pt x="0" y="1462"/>
+                  </a:cubicBezTo>
+                  <a:lnTo>
+                    <a:pt x="0" y="1613"/>
+                  </a:lnTo>
+                  <a:cubicBezTo>
+                    <a:pt x="0" y="1639"/>
+                    <a:pt x="26" y="1661"/>
+                    <a:pt x="51" y="1661"/>
+                  </a:cubicBezTo>
+                  <a:cubicBezTo>
+                    <a:pt x="61" y="1661"/>
+                    <a:pt x="71" y="1658"/>
+                    <a:pt x="80" y="1649"/>
+                  </a:cubicBezTo>
+                  <a:lnTo>
+                    <a:pt x="1111" y="878"/>
+                  </a:lnTo>
+                  <a:cubicBezTo>
+                    <a:pt x="1147" y="856"/>
+                    <a:pt x="1147" y="806"/>
+                    <a:pt x="1111" y="784"/>
+                  </a:cubicBezTo>
+                  <a:lnTo>
+                    <a:pt x="80" y="12"/>
+                  </a:lnTo>
+                  <a:cubicBezTo>
+                    <a:pt x="72" y="4"/>
+                    <a:pt x="62" y="1"/>
+                    <a:pt x="52" y="1"/>
+                  </a:cubicBezTo>
+                  <a:close/>
+                </a:path>
+              </a:pathLst>
+            </a:custGeom>
+            <a:solidFill>
+              <a:schemeClr val="tx1"/>
+            </a:solidFill>
+            <a:ln>
+              <a:noFill/>
+            </a:ln>
+          </p:spPr>
+          <p:txBody>
+            <a:bodyPr spcFirstLastPara="1" wrap="square" lIns="182850" tIns="182850" rIns="182850" bIns="182850" anchor="ctr" anchorCtr="0">
+              <a:noAutofit/>
+            </a:bodyPr>
+            <a:lstStyle/>
+            <a:p>
+              <a:endParaRPr sz="3600"/>
+            </a:p>
+          </p:txBody>
+        </p:sp>
+        <p:sp>
+          <p:nvSpPr>
+            <p:cNvPr id="19" name="Rectangle: Rounded Corners 18">
+              <a:extLst>
+                <a:ext uri="{FF2B5EF4-FFF2-40B4-BE49-F238E27FC236}">
+                  <a16:creationId xmlns:a16="http://schemas.microsoft.com/office/drawing/2014/main" id="{991CA826-51D4-4599-7EDF-1CEA5705FA22}"/>
+                </a:ext>
+              </a:extLst>
+            </p:cNvPr>
+            <p:cNvSpPr>
+              <a:spLocks noChangeAspect="1"/>
+            </p:cNvSpPr>
+            <p:nvPr/>
+          </p:nvSpPr>
+          <p:spPr>
+            <a:xfrm>
+              <a:off x="3045724" y="559642"/>
+              <a:ext cx="277716" cy="277716"/>
+            </a:xfrm>
+            <a:prstGeom prst="roundRect">
+              <a:avLst/>
+            </a:prstGeom>
+            <a:solidFill>
+              <a:schemeClr val="tx1"/>
+            </a:solidFill>
+            <a:ln>
+              <a:noFill/>
+            </a:ln>
+          </p:spPr>
+          <p:style>
+            <a:lnRef idx="2">
+              <a:schemeClr val="accent1">
+                <a:shade val="50000"/>
+              </a:schemeClr>
+            </a:lnRef>
+            <a:fillRef idx="1">
+              <a:schemeClr val="accent1"/>
+            </a:fillRef>
+            <a:effectRef idx="0">
+              <a:schemeClr val="accent1"/>
+            </a:effectRef>
+            <a:fontRef idx="minor">
+              <a:schemeClr val="lt1"/>
+            </a:fontRef>
+          </p:style>
+          <p:txBody>
+            <a:bodyPr rtlCol="0" anchor="ctr"/>
+            <a:lstStyle/>
+            <a:p>
+              <a:pPr algn="ctr"/>
+              <a:endParaRPr lang="en-GB" sz="3600">
+                <a:solidFill>
+                  <a:schemeClr val="tx1"/>
+                </a:solidFill>
+              </a:endParaRPr>
+            </a:p>
+          </p:txBody>
+        </p:sp>
+        <p:sp>
+          <p:nvSpPr>
+            <p:cNvPr id="6" name="TextBox 5">
+              <a:extLst>
+                <a:ext uri="{FF2B5EF4-FFF2-40B4-BE49-F238E27FC236}">
+                  <a16:creationId xmlns:a16="http://schemas.microsoft.com/office/drawing/2014/main" id="{9F1A65CA-823F-AA8A-6A48-67EE1CDFA4CF}"/>
+                </a:ext>
+              </a:extLst>
+            </p:cNvPr>
+            <p:cNvSpPr txBox="1"/>
+            <p:nvPr/>
+          </p:nvSpPr>
+          <p:spPr>
+            <a:xfrm>
+              <a:off x="213406" y="-68322"/>
+              <a:ext cx="732893" cy="1200329"/>
+            </a:xfrm>
+            <a:prstGeom prst="rect">
+              <a:avLst/>
+            </a:prstGeom>
+            <a:noFill/>
+            <a:effectLst/>
+          </p:spPr>
+          <p:txBody>
+            <a:bodyPr wrap="none" rtlCol="0">
+              <a:spAutoFit/>
+            </a:bodyPr>
+            <a:lstStyle/>
+            <a:p>
+              <a:r>
+                <a:rPr lang="en-GB" sz="7200" dirty="0">
+                  <a:latin typeface="Geist" pitchFamily="2" charset="77"/>
+                  <a:ea typeface="Geist" pitchFamily="2" charset="77"/>
+                  <a:cs typeface="Geist" pitchFamily="2" charset="77"/>
+                </a:rPr>
+                <a:t>g</a:t>
+              </a:r>
+            </a:p>
+          </p:txBody>
+        </p:sp>
+      </p:grpSp>
+    </p:spTree>
+    <p:extLst>
+      <p:ext uri="{BB962C8B-B14F-4D97-AF65-F5344CB8AC3E}">
+        <p14:creationId xmlns:p14="http://schemas.microsoft.com/office/powerpoint/2010/main" val="9090863"/>
       </p:ext>
     </p:extLst>
   </p:cSld>

</xml_diff>